<commit_message>
Names changed for clarity on git
</commit_message>
<xml_diff>
--- a/Presentation.pptx
+++ b/Presentation.pptx
@@ -5,7 +5,7 @@
     <p:sldMasterId id="2147483660" r:id="rId1"/>
   </p:sldMasterIdLst>
   <p:notesMasterIdLst>
-    <p:notesMasterId r:id="rId14"/>
+    <p:notesMasterId r:id="rId13"/>
   </p:notesMasterIdLst>
   <p:sldIdLst>
     <p:sldId id="275" r:id="rId2"/>
@@ -18,8 +18,7 @@
     <p:sldId id="280" r:id="rId9"/>
     <p:sldId id="278" r:id="rId10"/>
     <p:sldId id="273" r:id="rId11"/>
-    <p:sldId id="274" r:id="rId12"/>
-    <p:sldId id="282" r:id="rId13"/>
+    <p:sldId id="282" r:id="rId12"/>
   </p:sldIdLst>
   <p:sldSz cx="9144000" cy="5143500" type="screen16x9"/>
   <p:notesSz cx="6858000" cy="9144000"/>
@@ -855,7 +854,7 @@
           <a:p>
             <a:fld id="{1160EA64-D806-43AC-9DF2-F8C432F32B4C}" type="datetimeFigureOut">
               <a:rPr lang="en-US" dirty="0"/>
-              <a:t>2/7/2020</a:t>
+              <a:t>2/14/2020</a:t>
             </a:fld>
             <a:endParaRPr lang="en-US" dirty="0"/>
           </a:p>
@@ -1035,7 +1034,7 @@
           <a:p>
             <a:fld id="{E9F9C37B-1D36-470B-8223-D6C91242EC14}" type="datetimeFigureOut">
               <a:rPr lang="en-US" dirty="0"/>
-              <a:t>2/7/2020</a:t>
+              <a:t>2/14/2020</a:t>
             </a:fld>
             <a:endParaRPr lang="en-US" dirty="0"/>
           </a:p>
@@ -1225,7 +1224,7 @@
           <a:p>
             <a:fld id="{67C6F52A-A82B-47A2-A83A-8C4C91F2D59F}" type="datetimeFigureOut">
               <a:rPr lang="en-US" dirty="0"/>
-              <a:t>2/7/2020</a:t>
+              <a:t>2/14/2020</a:t>
             </a:fld>
             <a:endParaRPr lang="en-US" dirty="0"/>
           </a:p>
@@ -1928,7 +1927,7 @@
           <a:p>
             <a:fld id="{F070A7B3-6521-4DCA-87E5-044747A908C1}" type="datetimeFigureOut">
               <a:rPr lang="en-US" dirty="0"/>
-              <a:t>2/7/2020</a:t>
+              <a:t>2/14/2020</a:t>
             </a:fld>
             <a:endParaRPr lang="en-US" dirty="0"/>
           </a:p>
@@ -2206,7 +2205,7 @@
           <a:p>
             <a:fld id="{1160EA64-D806-43AC-9DF2-F8C432F32B4C}" type="datetimeFigureOut">
               <a:rPr lang="en-US" dirty="0"/>
-              <a:t>2/7/2020</a:t>
+              <a:t>2/14/2020</a:t>
             </a:fld>
             <a:endParaRPr lang="en-US" dirty="0"/>
           </a:p>
@@ -2448,7 +2447,7 @@
           <a:p>
             <a:fld id="{AB134690-1557-4C89-A502-4959FE7FAD70}" type="datetimeFigureOut">
               <a:rPr lang="en-US" dirty="0"/>
-              <a:t>2/7/2020</a:t>
+              <a:t>2/14/2020</a:t>
             </a:fld>
             <a:endParaRPr lang="en-US" dirty="0"/>
           </a:p>
@@ -2817,7 +2816,7 @@
           <a:p>
             <a:fld id="{4F7D4976-E339-4826-83B7-FBD03F55ECF8}" type="datetimeFigureOut">
               <a:rPr lang="en-US" dirty="0"/>
-              <a:t>2/7/2020</a:t>
+              <a:t>2/14/2020</a:t>
             </a:fld>
             <a:endParaRPr lang="en-US" dirty="0"/>
           </a:p>
@@ -2968,7 +2967,7 @@
           <a:p>
             <a:fld id="{E1037C31-9E7A-4F99-8774-A0E530DE1A42}" type="datetimeFigureOut">
               <a:rPr lang="en-US" dirty="0"/>
-              <a:t>2/7/2020</a:t>
+              <a:t>2/14/2020</a:t>
             </a:fld>
             <a:endParaRPr lang="en-US" dirty="0"/>
           </a:p>
@@ -3073,7 +3072,7 @@
           <a:p>
             <a:fld id="{C278504F-A551-4DE0-9316-4DCD1D8CC752}" type="datetimeFigureOut">
               <a:rPr lang="en-US" dirty="0"/>
-              <a:t>2/7/2020</a:t>
+              <a:t>2/14/2020</a:t>
             </a:fld>
             <a:endParaRPr lang="en-US" dirty="0"/>
           </a:p>
@@ -3439,7 +3438,7 @@
           <a:p>
             <a:fld id="{D1BE4249-C0D0-4B06-8692-E8BB871AF643}" type="datetimeFigureOut">
               <a:rPr lang="en-US" dirty="0"/>
-              <a:t>2/7/2020</a:t>
+              <a:t>2/14/2020</a:t>
             </a:fld>
             <a:endParaRPr lang="en-US" dirty="0"/>
           </a:p>
@@ -3806,7 +3805,7 @@
           <a:p>
             <a:fld id="{042B0DB6-F5C7-45FB-8CF3-31B45F9C2DAC}" type="datetimeFigureOut">
               <a:rPr lang="en-US" dirty="0"/>
-              <a:t>2/7/2020</a:t>
+              <a:t>2/14/2020</a:t>
             </a:fld>
             <a:endParaRPr lang="en-US" dirty="0"/>
           </a:p>
@@ -4057,7 +4056,7 @@
           <a:p>
             <a:fld id="{1160EA64-D806-43AC-9DF2-F8C432F32B4C}" type="datetimeFigureOut">
               <a:rPr lang="en-US" dirty="0"/>
-              <a:t>2/7/2020</a:t>
+              <a:t>2/14/2020</a:t>
             </a:fld>
             <a:endParaRPr lang="en-US" dirty="0"/>
           </a:p>
@@ -4586,6 +4585,104 @@
           </a:extLst>
         </p:spPr>
       </p:pic>
+      <p:sp>
+        <p:nvSpPr>
+          <p:cNvPr id="3" name="TextBox 2">
+            <a:extLst>
+              <a:ext uri="{FF2B5EF4-FFF2-40B4-BE49-F238E27FC236}">
+                <a16:creationId xmlns:a16="http://schemas.microsoft.com/office/drawing/2014/main" id="{C4A1BD53-86E0-4865-A62A-7D95B72768E0}"/>
+              </a:ext>
+            </a:extLst>
+          </p:cNvPr>
+          <p:cNvSpPr txBox="1"/>
+          <p:nvPr/>
+        </p:nvSpPr>
+        <p:spPr>
+          <a:xfrm>
+            <a:off x="7389158" y="3943171"/>
+            <a:ext cx="1754842" cy="1200329"/>
+          </a:xfrm>
+          <a:prstGeom prst="rect">
+            <a:avLst/>
+          </a:prstGeom>
+          <a:noFill/>
+        </p:spPr>
+        <p:txBody>
+          <a:bodyPr wrap="square" rtlCol="0">
+            <a:spAutoFit/>
+          </a:bodyPr>
+          <a:lstStyle/>
+          <a:p>
+            <a:r>
+              <a:rPr lang="en-GB" sz="1200" dirty="0">
+                <a:solidFill>
+                  <a:schemeClr val="bg1"/>
+                </a:solidFill>
+                <a:latin typeface="+mj-lt"/>
+                <a:cs typeface="Arial" panose="020B0604020202020204" pitchFamily="34" charset="0"/>
+              </a:rPr>
+              <a:t>Group:</a:t>
+            </a:r>
+          </a:p>
+          <a:p>
+            <a:endParaRPr lang="en-GB" sz="1200" dirty="0">
+              <a:solidFill>
+                <a:schemeClr val="bg1"/>
+              </a:solidFill>
+              <a:latin typeface="+mj-lt"/>
+              <a:cs typeface="Arial" panose="020B0604020202020204" pitchFamily="34" charset="0"/>
+            </a:endParaRPr>
+          </a:p>
+          <a:p>
+            <a:r>
+              <a:rPr lang="en-GB" sz="1200" dirty="0">
+                <a:solidFill>
+                  <a:schemeClr val="bg1"/>
+                </a:solidFill>
+                <a:latin typeface="+mj-lt"/>
+                <a:cs typeface="Arial" panose="020B0604020202020204" pitchFamily="34" charset="0"/>
+              </a:rPr>
+              <a:t>Guilherme Meirelles</a:t>
+            </a:r>
+          </a:p>
+          <a:p>
+            <a:r>
+              <a:rPr lang="en-GB" sz="1200" dirty="0">
+                <a:solidFill>
+                  <a:schemeClr val="bg1"/>
+                </a:solidFill>
+                <a:latin typeface="+mj-lt"/>
+                <a:cs typeface="Arial" panose="020B0604020202020204" pitchFamily="34" charset="0"/>
+              </a:rPr>
+              <a:t>Kandauda Perera</a:t>
+            </a:r>
+          </a:p>
+          <a:p>
+            <a:r>
+              <a:rPr lang="en-GB" sz="1200" dirty="0">
+                <a:solidFill>
+                  <a:schemeClr val="bg1"/>
+                </a:solidFill>
+                <a:latin typeface="+mj-lt"/>
+                <a:cs typeface="Arial" panose="020B0604020202020204" pitchFamily="34" charset="0"/>
+              </a:rPr>
+              <a:t>Abbas Momin</a:t>
+            </a:r>
+          </a:p>
+          <a:p>
+            <a:r>
+              <a:rPr lang="en-GB" sz="1200" dirty="0">
+                <a:solidFill>
+                  <a:schemeClr val="bg1"/>
+                </a:solidFill>
+                <a:latin typeface="+mj-lt"/>
+                <a:cs typeface="Arial" panose="020B0604020202020204" pitchFamily="34" charset="0"/>
+              </a:rPr>
+              <a:t>Darek Mucus</a:t>
+            </a:r>
+          </a:p>
+        </p:txBody>
+      </p:sp>
     </p:spTree>
     <p:extLst>
       <p:ext uri="{BB962C8B-B14F-4D97-AF65-F5344CB8AC3E}">
@@ -4765,8 +4862,85 @@
                   <a:schemeClr val="tx1"/>
                 </a:solidFill>
               </a:rPr>
-              <a:t>(Single player mode / play against AI) – This can be done using several IF statements. The ships would be placed by linking the 4x4 grid to separate variables (or list) and using the random function to choose a point in the grid to place a part of a ship, the random function would then be used to choose what direction to extend the ship.  After placing the ships, the random function would be used for the AI to guess the player’s ships. Every time the random function is used, whether for placing ships or guessing them, it would first check whether the grid space / variable is taken / guessed already. All the variables for the grid spaces would be false by default and turned true after choosing a spot with the random function.</a:t>
-            </a:r>
+              <a:t>Single Player </a:t>
+            </a:r>
+            <a:r>
+              <a:rPr lang="en-GB" sz="1400" dirty="0" err="1">
+                <a:solidFill>
+                  <a:schemeClr val="tx1"/>
+                </a:solidFill>
+              </a:rPr>
+              <a:t>PvE</a:t>
+            </a:r>
+            <a:r>
+              <a:rPr lang="en-GB" sz="1400" dirty="0">
+                <a:solidFill>
+                  <a:schemeClr val="tx1"/>
+                </a:solidFill>
+              </a:rPr>
+              <a:t> – Allow the Player to play against A.I. locally with different difficulty levels.</a:t>
+            </a:r>
+          </a:p>
+          <a:p>
+            <a:pPr indent="0">
+              <a:spcBef>
+                <a:spcPts val="1600"/>
+              </a:spcBef>
+              <a:buNone/>
+            </a:pPr>
+            <a:r>
+              <a:rPr lang="en-GB" sz="1400" dirty="0">
+                <a:solidFill>
+                  <a:schemeClr val="tx1"/>
+                </a:solidFill>
+              </a:rPr>
+              <a:t>Online / LAN </a:t>
+            </a:r>
+            <a:r>
+              <a:rPr lang="en-GB" sz="1400" dirty="0" err="1">
+                <a:solidFill>
+                  <a:schemeClr val="tx1"/>
+                </a:solidFill>
+              </a:rPr>
+              <a:t>PvP</a:t>
+            </a:r>
+            <a:r>
+              <a:rPr lang="en-GB" sz="1400" dirty="0">
+                <a:solidFill>
+                  <a:schemeClr val="tx1"/>
+                </a:solidFill>
+              </a:rPr>
+              <a:t>- Adding networking to allow the game to be played in two machines.</a:t>
+            </a:r>
+          </a:p>
+          <a:p>
+            <a:pPr indent="0">
+              <a:spcBef>
+                <a:spcPts val="1600"/>
+              </a:spcBef>
+              <a:buNone/>
+            </a:pPr>
+            <a:r>
+              <a:rPr lang="en-GB" sz="1400" dirty="0">
+                <a:solidFill>
+                  <a:schemeClr val="tx1"/>
+                </a:solidFill>
+              </a:rPr>
+              <a:t>Mouse Controls – Using mouse inputs instead of coordinates.</a:t>
+            </a:r>
+          </a:p>
+          <a:p>
+            <a:pPr lvl="0" indent="0">
+              <a:spcBef>
+                <a:spcPts val="1600"/>
+              </a:spcBef>
+              <a:buNone/>
+            </a:pPr>
+            <a:endParaRPr lang="en-GB" sz="1400" dirty="0">
+              <a:solidFill>
+                <a:schemeClr val="tx1"/>
+              </a:solidFill>
+            </a:endParaRPr>
           </a:p>
         </p:txBody>
       </p:sp>
@@ -4814,236 +4988,6 @@
 </file>
 
 <file path=ppt/slides/slide11.xml><?xml version="1.0" encoding="utf-8"?>
-<p:sld xmlns:a="http://schemas.openxmlformats.org/drawingml/2006/main" xmlns:r="http://schemas.openxmlformats.org/officeDocument/2006/relationships" xmlns:p="http://schemas.openxmlformats.org/presentationml/2006/main">
-  <p:cSld>
-    <p:spTree>
-      <p:nvGrpSpPr>
-        <p:cNvPr id="1" name=""/>
-        <p:cNvGrpSpPr/>
-        <p:nvPr/>
-      </p:nvGrpSpPr>
-      <p:grpSpPr>
-        <a:xfrm>
-          <a:off x="0" y="0"/>
-          <a:ext cx="0" cy="0"/>
-          <a:chOff x="0" y="0"/>
-          <a:chExt cx="0" cy="0"/>
-        </a:xfrm>
-      </p:grpSpPr>
-      <p:sp>
-        <p:nvSpPr>
-          <p:cNvPr id="7" name="Rectangle 6"/>
-          <p:cNvSpPr/>
-          <p:nvPr/>
-        </p:nvSpPr>
-        <p:spPr>
-          <a:xfrm>
-            <a:off x="3926540" y="0"/>
-            <a:ext cx="5217459" cy="5143501"/>
-          </a:xfrm>
-          <a:prstGeom prst="rect">
-            <a:avLst/>
-          </a:prstGeom>
-        </p:spPr>
-        <p:style>
-          <a:lnRef idx="2">
-            <a:schemeClr val="accent4">
-              <a:shade val="50000"/>
-            </a:schemeClr>
-          </a:lnRef>
-          <a:fillRef idx="1">
-            <a:schemeClr val="accent4"/>
-          </a:fillRef>
-          <a:effectRef idx="0">
-            <a:schemeClr val="accent4"/>
-          </a:effectRef>
-          <a:fontRef idx="minor">
-            <a:schemeClr val="lt1"/>
-          </a:fontRef>
-        </p:style>
-        <p:txBody>
-          <a:bodyPr rtlCol="0" anchor="ctr"/>
-          <a:lstStyle/>
-          <a:p>
-            <a:pPr algn="ctr"/>
-            <a:endParaRPr lang="en-GB"/>
-          </a:p>
-        </p:txBody>
-      </p:sp>
-      <p:sp>
-        <p:nvSpPr>
-          <p:cNvPr id="5" name="Rectangle 4"/>
-          <p:cNvSpPr/>
-          <p:nvPr/>
-        </p:nvSpPr>
-        <p:spPr>
-          <a:xfrm>
-            <a:off x="0" y="0"/>
-            <a:ext cx="3926540" cy="5143500"/>
-          </a:xfrm>
-          <a:prstGeom prst="rect">
-            <a:avLst/>
-          </a:prstGeom>
-        </p:spPr>
-        <p:style>
-          <a:lnRef idx="2">
-            <a:schemeClr val="accent1">
-              <a:shade val="50000"/>
-            </a:schemeClr>
-          </a:lnRef>
-          <a:fillRef idx="1">
-            <a:schemeClr val="accent1"/>
-          </a:fillRef>
-          <a:effectRef idx="0">
-            <a:schemeClr val="accent1"/>
-          </a:effectRef>
-          <a:fontRef idx="minor">
-            <a:schemeClr val="lt1"/>
-          </a:fontRef>
-        </p:style>
-        <p:txBody>
-          <a:bodyPr rtlCol="0" anchor="ctr"/>
-          <a:lstStyle/>
-          <a:p>
-            <a:pPr algn="ctr"/>
-            <a:endParaRPr lang="en-GB"/>
-          </a:p>
-        </p:txBody>
-      </p:sp>
-      <p:sp>
-        <p:nvSpPr>
-          <p:cNvPr id="2" name="Title 1"/>
-          <p:cNvSpPr>
-            <a:spLocks noGrp="1"/>
-          </p:cNvSpPr>
-          <p:nvPr>
-            <p:ph type="title"/>
-          </p:nvPr>
-        </p:nvSpPr>
-        <p:spPr>
-          <a:xfrm>
-            <a:off x="705970" y="308114"/>
-            <a:ext cx="2514600" cy="788347"/>
-          </a:xfrm>
-        </p:spPr>
-        <p:txBody>
-          <a:bodyPr/>
-          <a:lstStyle/>
-          <a:p>
-            <a:r>
-              <a:rPr lang="en-GB" sz="1800" dirty="0">
-                <a:solidFill>
-                  <a:schemeClr val="tx1"/>
-                </a:solidFill>
-              </a:rPr>
-              <a:t>extensions</a:t>
-            </a:r>
-          </a:p>
-        </p:txBody>
-      </p:sp>
-      <p:sp>
-        <p:nvSpPr>
-          <p:cNvPr id="10" name="Text Placeholder 3">
-            <a:extLst>
-              <a:ext uri="{FF2B5EF4-FFF2-40B4-BE49-F238E27FC236}">
-                <a16:creationId xmlns:a16="http://schemas.microsoft.com/office/drawing/2014/main" id="{8654450E-5F5D-476B-9A3C-0B4E4DC25181}"/>
-              </a:ext>
-            </a:extLst>
-          </p:cNvPr>
-          <p:cNvSpPr>
-            <a:spLocks noGrp="1"/>
-          </p:cNvSpPr>
-          <p:nvPr>
-            <p:ph type="body" idx="2"/>
-          </p:nvPr>
-        </p:nvSpPr>
-        <p:spPr>
-          <a:xfrm>
-            <a:off x="4769588" y="888401"/>
-            <a:ext cx="3837000" cy="3695100"/>
-          </a:xfrm>
-        </p:spPr>
-        <p:txBody>
-          <a:bodyPr/>
-          <a:lstStyle/>
-          <a:p>
-            <a:pPr indent="0">
-              <a:spcBef>
-                <a:spcPts val="1600"/>
-              </a:spcBef>
-              <a:buNone/>
-            </a:pPr>
-            <a:r>
-              <a:rPr lang="en-GB" sz="1400" dirty="0">
-                <a:solidFill>
-                  <a:schemeClr val="tx1"/>
-                </a:solidFill>
-              </a:rPr>
-              <a:t>Difficulty – A difficulty setting in the start menu would set how many ships are placed on the grid and how many have to be sunk to win the game. The lengths of the ships placed would be pre-set so the AI would place the same length ships as the player.</a:t>
-            </a:r>
-          </a:p>
-          <a:p>
-            <a:pPr lvl="0" indent="0">
-              <a:spcBef>
-                <a:spcPts val="1600"/>
-              </a:spcBef>
-              <a:buNone/>
-            </a:pPr>
-            <a:r>
-              <a:rPr lang="en-GB" sz="1400" dirty="0">
-                <a:solidFill>
-                  <a:schemeClr val="tx1"/>
-                </a:solidFill>
-              </a:rPr>
-              <a:t>Online / LAN – It’s possible to add a LAN option to the game so that you can play against someone on 2 different computers which would take away the need to turn around when the opponent is placing their ships at the start of the games.</a:t>
-            </a:r>
-          </a:p>
-        </p:txBody>
-      </p:sp>
-      <p:pic>
-        <p:nvPicPr>
-          <p:cNvPr id="3" name="Picture 2"/>
-          <p:cNvPicPr>
-            <a:picLocks noChangeAspect="1"/>
-          </p:cNvPicPr>
-          <p:nvPr/>
-        </p:nvPicPr>
-        <p:blipFill>
-          <a:blip r:embed="rId2">
-            <a:extLst>
-              <a:ext uri="{28A0092B-C50C-407E-A947-70E740481C1C}">
-                <a14:useLocalDpi xmlns:a14="http://schemas.microsoft.com/office/drawing/2010/main" val="0"/>
-              </a:ext>
-            </a:extLst>
-          </a:blip>
-          <a:stretch>
-            <a:fillRect/>
-          </a:stretch>
-        </p:blipFill>
-        <p:spPr>
-          <a:xfrm>
-            <a:off x="198285" y="1585688"/>
-            <a:ext cx="3529969" cy="2997813"/>
-          </a:xfrm>
-          <a:prstGeom prst="rect">
-            <a:avLst/>
-          </a:prstGeom>
-        </p:spPr>
-      </p:pic>
-    </p:spTree>
-    <p:extLst>
-      <p:ext uri="{BB962C8B-B14F-4D97-AF65-F5344CB8AC3E}">
-        <p14:creationId xmlns:p14="http://schemas.microsoft.com/office/powerpoint/2010/main" val="3029496624"/>
-      </p:ext>
-    </p:extLst>
-  </p:cSld>
-  <p:clrMapOvr>
-    <a:masterClrMapping/>
-  </p:clrMapOvr>
-</p:sld>
-</file>
-
-<file path=ppt/slides/slide12.xml><?xml version="1.0" encoding="utf-8"?>
 <p:sld xmlns:a="http://schemas.openxmlformats.org/drawingml/2006/main" xmlns:r="http://schemas.openxmlformats.org/officeDocument/2006/relationships" xmlns:p="http://schemas.openxmlformats.org/presentationml/2006/main">
   <p:cSld>
     <p:spTree>
@@ -5666,7 +5610,7 @@
           <a:lstStyle/>
           <a:p>
             <a:pPr algn="ctr"/>
-            <a:endParaRPr lang="en-GB"/>
+            <a:endParaRPr lang="en-GB" dirty="0"/>
           </a:p>
         </p:txBody>
       </p:sp>
@@ -5795,44 +5739,35 @@
             </a:pPr>
             <a:r>
               <a:rPr lang="en-GB" sz="1400" dirty="0"/>
-              <a:t>Once a player has won, a message will be displayed on the top-right side of the screen letting them know they have won. No further moves are able to be made at this point.</a:t>
-            </a:r>
-          </a:p>
-          <a:p>
-            <a:pPr lvl="0" indent="0">
-              <a:spcBef>
-                <a:spcPts val="1600"/>
-              </a:spcBef>
-              <a:buNone/>
-            </a:pPr>
-            <a:endParaRPr lang="en-GB" sz="1400" dirty="0"/>
+              <a:t>Once a player has won, a box will pop up showing the winner.</a:t>
+            </a:r>
           </a:p>
         </p:txBody>
       </p:sp>
       <p:pic>
         <p:nvPicPr>
-          <p:cNvPr id="3" name="Picture 2"/>
+          <p:cNvPr id="4" name="Picture 3">
+            <a:extLst>
+              <a:ext uri="{FF2B5EF4-FFF2-40B4-BE49-F238E27FC236}">
+                <a16:creationId xmlns:a16="http://schemas.microsoft.com/office/drawing/2014/main" id="{EA523ED0-22AA-4837-A7F7-131246F9BFD1}"/>
+              </a:ext>
+            </a:extLst>
+          </p:cNvPr>
           <p:cNvPicPr>
             <a:picLocks noChangeAspect="1"/>
           </p:cNvPicPr>
           <p:nvPr/>
         </p:nvPicPr>
         <p:blipFill>
-          <a:blip r:embed="rId2">
-            <a:extLst>
-              <a:ext uri="{28A0092B-C50C-407E-A947-70E740481C1C}">
-                <a14:useLocalDpi xmlns:a14="http://schemas.microsoft.com/office/drawing/2010/main" val="0"/>
-              </a:ext>
-            </a:extLst>
-          </a:blip>
+          <a:blip r:embed="rId2"/>
           <a:stretch>
             <a:fillRect/>
           </a:stretch>
         </p:blipFill>
         <p:spPr>
           <a:xfrm>
-            <a:off x="143812" y="1603213"/>
-            <a:ext cx="3668123" cy="3122986"/>
+            <a:off x="127569" y="1388189"/>
+            <a:ext cx="3698385" cy="3221622"/>
           </a:xfrm>
           <a:prstGeom prst="rect">
             <a:avLst/>
@@ -5841,28 +5776,28 @@
       </p:pic>
       <p:pic>
         <p:nvPicPr>
-          <p:cNvPr id="9" name="Picture 8"/>
+          <p:cNvPr id="6" name="Picture 5">
+            <a:extLst>
+              <a:ext uri="{FF2B5EF4-FFF2-40B4-BE49-F238E27FC236}">
+                <a16:creationId xmlns:a16="http://schemas.microsoft.com/office/drawing/2014/main" id="{0042E4D8-6A0D-4765-B8C6-FAA619DF6DCB}"/>
+              </a:ext>
+            </a:extLst>
+          </p:cNvPr>
           <p:cNvPicPr>
             <a:picLocks noChangeAspect="1"/>
           </p:cNvPicPr>
           <p:nvPr/>
         </p:nvPicPr>
         <p:blipFill>
-          <a:blip r:embed="rId3">
-            <a:extLst>
-              <a:ext uri="{28A0092B-C50C-407E-A947-70E740481C1C}">
-                <a14:useLocalDpi xmlns:a14="http://schemas.microsoft.com/office/drawing/2010/main" val="0"/>
-              </a:ext>
-            </a:extLst>
-          </a:blip>
+          <a:blip r:embed="rId3"/>
           <a:stretch>
             <a:fillRect/>
           </a:stretch>
         </p:blipFill>
         <p:spPr>
           <a:xfrm>
-            <a:off x="6191548" y="1388189"/>
-            <a:ext cx="2799739" cy="2367117"/>
+            <a:off x="6201267" y="858374"/>
+            <a:ext cx="2815164" cy="3047997"/>
           </a:xfrm>
           <a:prstGeom prst="rect">
             <a:avLst/>
@@ -6052,28 +5987,28 @@
       </p:sp>
       <p:pic>
         <p:nvPicPr>
-          <p:cNvPr id="4" name="Picture 3"/>
+          <p:cNvPr id="3" name="Picture 2">
+            <a:extLst>
+              <a:ext uri="{FF2B5EF4-FFF2-40B4-BE49-F238E27FC236}">
+                <a16:creationId xmlns:a16="http://schemas.microsoft.com/office/drawing/2014/main" id="{F82D2E4B-D813-4F33-A756-BED5BC93AE31}"/>
+              </a:ext>
+            </a:extLst>
+          </p:cNvPr>
           <p:cNvPicPr>
             <a:picLocks noChangeAspect="1"/>
           </p:cNvPicPr>
           <p:nvPr/>
         </p:nvPicPr>
         <p:blipFill>
-          <a:blip r:embed="rId2">
-            <a:extLst>
-              <a:ext uri="{28A0092B-C50C-407E-A947-70E740481C1C}">
-                <a14:useLocalDpi xmlns:a14="http://schemas.microsoft.com/office/drawing/2010/main" val="0"/>
-              </a:ext>
-            </a:extLst>
-          </a:blip>
+          <a:blip r:embed="rId2"/>
           <a:stretch>
             <a:fillRect/>
           </a:stretch>
         </p:blipFill>
         <p:spPr>
           <a:xfrm>
-            <a:off x="113750" y="1399880"/>
-            <a:ext cx="3699040" cy="3145347"/>
+            <a:off x="62546" y="1297136"/>
+            <a:ext cx="3801448" cy="3350835"/>
           </a:xfrm>
           <a:prstGeom prst="rect">
             <a:avLst/>
@@ -6294,28 +6229,28 @@
       </p:sp>
       <p:pic>
         <p:nvPicPr>
-          <p:cNvPr id="9" name="Picture 8"/>
+          <p:cNvPr id="3" name="Picture 2">
+            <a:extLst>
+              <a:ext uri="{FF2B5EF4-FFF2-40B4-BE49-F238E27FC236}">
+                <a16:creationId xmlns:a16="http://schemas.microsoft.com/office/drawing/2014/main" id="{7764699D-C7D7-42C4-B114-3B6E2EF78DDD}"/>
+              </a:ext>
+            </a:extLst>
+          </p:cNvPr>
           <p:cNvPicPr>
             <a:picLocks noChangeAspect="1"/>
           </p:cNvPicPr>
           <p:nvPr/>
         </p:nvPicPr>
         <p:blipFill>
-          <a:blip r:embed="rId2">
-            <a:extLst>
-              <a:ext uri="{28A0092B-C50C-407E-A947-70E740481C1C}">
-                <a14:useLocalDpi xmlns:a14="http://schemas.microsoft.com/office/drawing/2010/main" val="0"/>
-              </a:ext>
-            </a:extLst>
-          </a:blip>
+          <a:blip r:embed="rId2"/>
           <a:stretch>
             <a:fillRect/>
           </a:stretch>
         </p:blipFill>
         <p:spPr>
           <a:xfrm>
-            <a:off x="319021" y="1677411"/>
-            <a:ext cx="3378336" cy="2960267"/>
+            <a:off x="146094" y="1623785"/>
+            <a:ext cx="3634352" cy="3183474"/>
           </a:xfrm>
           <a:prstGeom prst="rect">
             <a:avLst/>
@@ -7150,7 +7085,7 @@
         </p:nvSpPr>
         <p:spPr>
           <a:xfrm>
-            <a:off x="-1" y="0"/>
+            <a:off x="0" y="0"/>
             <a:ext cx="9143999" cy="5143500"/>
           </a:xfrm>
           <a:prstGeom prst="rect">
@@ -7211,28 +7146,28 @@
       </p:sp>
       <p:pic>
         <p:nvPicPr>
-          <p:cNvPr id="13" name="Picture 12"/>
+          <p:cNvPr id="6" name="Picture 5">
+            <a:extLst>
+              <a:ext uri="{FF2B5EF4-FFF2-40B4-BE49-F238E27FC236}">
+                <a16:creationId xmlns:a16="http://schemas.microsoft.com/office/drawing/2014/main" id="{E1A328CF-A414-40E6-8EAA-00586479FEEC}"/>
+              </a:ext>
+            </a:extLst>
+          </p:cNvPr>
           <p:cNvPicPr>
             <a:picLocks noChangeAspect="1"/>
           </p:cNvPicPr>
           <p:nvPr/>
         </p:nvPicPr>
         <p:blipFill>
-          <a:blip r:embed="rId2">
-            <a:extLst>
-              <a:ext uri="{28A0092B-C50C-407E-A947-70E740481C1C}">
-                <a14:useLocalDpi xmlns:a14="http://schemas.microsoft.com/office/drawing/2010/main" val="0"/>
-              </a:ext>
-            </a:extLst>
-          </a:blip>
+          <a:blip r:embed="rId2"/>
           <a:stretch>
             <a:fillRect/>
           </a:stretch>
         </p:blipFill>
         <p:spPr>
           <a:xfrm>
-            <a:off x="1330895" y="1293949"/>
-            <a:ext cx="6323853" cy="3172431"/>
+            <a:off x="1487674" y="1241459"/>
+            <a:ext cx="5810840" cy="3489512"/>
           </a:xfrm>
           <a:prstGeom prst="rect">
             <a:avLst/>

</xml_diff>